<commit_message>
Small update thesis, sources, notes on ppt
</commit_message>
<xml_diff>
--- a/Thesis/progress meeting presentation.pptx
+++ b/Thesis/progress meeting presentation.pptx
@@ -232,7 +232,7 @@
           <a:p>
             <a:fld id="{DBAE3B3E-782A-9745-8E84-372F7B6771BF}" type="datetimeFigureOut">
               <a:rPr lang="en-US" smtClean="0"/>
-              <a:t>3/10/2016</a:t>
+              <a:t>5/30/2016</a:t>
             </a:fld>
             <a:endParaRPr lang="en-US" dirty="0"/>
           </a:p>
@@ -397,7 +397,7 @@
           <a:p>
             <a:fld id="{2D2F14E1-C5B1-40B4-8FD5-AE5FDC1E5B73}" type="datetimeFigureOut">
               <a:rPr lang="en-GB" smtClean="0"/>
-              <a:t>10/03/2016</a:t>
+              <a:t>30/05/2016</a:t>
             </a:fld>
             <a:endParaRPr lang="en-GB"/>
           </a:p>
@@ -711,6 +711,808 @@
           <a:p>
             <a:r>
               <a:rPr lang="en-GB" dirty="0" smtClean="0"/>
+              <a:t>In my search</a:t>
+            </a:r>
+            <a:r>
+              <a:rPr lang="en-GB" baseline="0" dirty="0" smtClean="0"/>
+              <a:t> to increase the coherence time of </a:t>
+            </a:r>
+            <a:r>
+              <a:rPr lang="en-GB" baseline="0" dirty="0" err="1" smtClean="0"/>
+              <a:t>transmon</a:t>
+            </a:r>
+            <a:r>
+              <a:rPr lang="en-GB" baseline="0" dirty="0" smtClean="0"/>
+              <a:t> qubits I have focused on one specific source of </a:t>
+            </a:r>
+            <a:r>
+              <a:rPr lang="en-GB" baseline="0" dirty="0" err="1" smtClean="0"/>
+              <a:t>decoherence</a:t>
+            </a:r>
+            <a:r>
+              <a:rPr lang="en-GB" baseline="0" dirty="0" smtClean="0"/>
+              <a:t>. Namely the two-level systems in </a:t>
+            </a:r>
+            <a:r>
+              <a:rPr lang="en-GB" baseline="0" dirty="0" err="1" smtClean="0"/>
+              <a:t>lossy</a:t>
+            </a:r>
+            <a:r>
+              <a:rPr lang="en-GB" baseline="0" dirty="0" smtClean="0"/>
+              <a:t> layers.</a:t>
+            </a:r>
+            <a:endParaRPr lang="en-GB" dirty="0"/>
+          </a:p>
+        </p:txBody>
+      </p:sp>
+      <p:sp>
+        <p:nvSpPr>
+          <p:cNvPr id="4" name="Slide Number Placeholder 3"/>
+          <p:cNvSpPr>
+            <a:spLocks noGrp="1"/>
+          </p:cNvSpPr>
+          <p:nvPr>
+            <p:ph type="sldNum" sz="quarter" idx="10"/>
+          </p:nvPr>
+        </p:nvSpPr>
+        <p:spPr/>
+        <p:txBody>
+          <a:bodyPr/>
+          <a:lstStyle/>
+          <a:p>
+            <a:fld id="{6E561419-CA27-4451-8C11-F1E3F24100C3}" type="slidenum">
+              <a:rPr lang="en-GB" smtClean="0"/>
+              <a:t>1</a:t>
+            </a:fld>
+            <a:endParaRPr lang="en-GB"/>
+          </a:p>
+        </p:txBody>
+      </p:sp>
+    </p:spTree>
+    <p:extLst>
+      <p:ext uri="{BB962C8B-B14F-4D97-AF65-F5344CB8AC3E}">
+        <p14:creationId xmlns:p14="http://schemas.microsoft.com/office/powerpoint/2010/main" val="998015098"/>
+      </p:ext>
+    </p:extLst>
+  </p:cSld>
+  <p:clrMapOvr>
+    <a:masterClrMapping/>
+  </p:clrMapOvr>
+</p:notes>
+</file>
+
+<file path=ppt/notesSlides/notesSlide2.xml><?xml version="1.0" encoding="utf-8"?>
+<p:notes xmlns:a="http://schemas.openxmlformats.org/drawingml/2006/main" xmlns:r="http://schemas.openxmlformats.org/officeDocument/2006/relationships" xmlns:p="http://schemas.openxmlformats.org/presentationml/2006/main">
+  <p:cSld>
+    <p:spTree>
+      <p:nvGrpSpPr>
+        <p:cNvPr id="1" name=""/>
+        <p:cNvGrpSpPr/>
+        <p:nvPr/>
+      </p:nvGrpSpPr>
+      <p:grpSpPr>
+        <a:xfrm>
+          <a:off x="0" y="0"/>
+          <a:ext cx="0" cy="0"/>
+          <a:chOff x="0" y="0"/>
+          <a:chExt cx="0" cy="0"/>
+        </a:xfrm>
+      </p:grpSpPr>
+      <p:sp>
+        <p:nvSpPr>
+          <p:cNvPr id="2" name="Slide Image Placeholder 1"/>
+          <p:cNvSpPr>
+            <a:spLocks noGrp="1" noRot="1" noChangeAspect="1"/>
+          </p:cNvSpPr>
+          <p:nvPr>
+            <p:ph type="sldImg"/>
+          </p:nvPr>
+        </p:nvSpPr>
+        <p:spPr/>
+      </p:sp>
+      <p:sp>
+        <p:nvSpPr>
+          <p:cNvPr id="3" name="Notes Placeholder 2"/>
+          <p:cNvSpPr>
+            <a:spLocks noGrp="1"/>
+          </p:cNvSpPr>
+          <p:nvPr>
+            <p:ph type="body" idx="1"/>
+          </p:nvPr>
+        </p:nvSpPr>
+        <p:spPr/>
+        <p:txBody>
+          <a:bodyPr/>
+          <a:lstStyle/>
+          <a:p>
+            <a:r>
+              <a:rPr lang="en-GB" dirty="0" smtClean="0"/>
+              <a:t>These</a:t>
+            </a:r>
+            <a:r>
+              <a:rPr lang="en-GB" baseline="0" dirty="0" smtClean="0"/>
+              <a:t> layers containing two-level systems are a prominent source of </a:t>
+            </a:r>
+            <a:r>
+              <a:rPr lang="en-GB" baseline="0" dirty="0" err="1" smtClean="0"/>
+              <a:t>decoherence</a:t>
+            </a:r>
+            <a:r>
+              <a:rPr lang="en-GB" baseline="0" dirty="0" smtClean="0"/>
+              <a:t>, if not a limiting factor to the coherence time of qubits. </a:t>
+            </a:r>
+            <a:endParaRPr lang="en-GB" dirty="0"/>
+          </a:p>
+        </p:txBody>
+      </p:sp>
+      <p:sp>
+        <p:nvSpPr>
+          <p:cNvPr id="4" name="Slide Number Placeholder 3"/>
+          <p:cNvSpPr>
+            <a:spLocks noGrp="1"/>
+          </p:cNvSpPr>
+          <p:nvPr>
+            <p:ph type="sldNum" sz="quarter" idx="10"/>
+          </p:nvPr>
+        </p:nvSpPr>
+        <p:spPr/>
+        <p:txBody>
+          <a:bodyPr/>
+          <a:lstStyle/>
+          <a:p>
+            <a:fld id="{6E561419-CA27-4451-8C11-F1E3F24100C3}" type="slidenum">
+              <a:rPr lang="en-GB" smtClean="0"/>
+              <a:t>2</a:t>
+            </a:fld>
+            <a:endParaRPr lang="en-GB"/>
+          </a:p>
+        </p:txBody>
+      </p:sp>
+    </p:spTree>
+    <p:extLst>
+      <p:ext uri="{BB962C8B-B14F-4D97-AF65-F5344CB8AC3E}">
+        <p14:creationId xmlns:p14="http://schemas.microsoft.com/office/powerpoint/2010/main" val="376085260"/>
+      </p:ext>
+    </p:extLst>
+  </p:cSld>
+  <p:clrMapOvr>
+    <a:masterClrMapping/>
+  </p:clrMapOvr>
+</p:notes>
+</file>
+
+<file path=ppt/notesSlides/notesSlide3.xml><?xml version="1.0" encoding="utf-8"?>
+<p:notes xmlns:a="http://schemas.openxmlformats.org/drawingml/2006/main" xmlns:r="http://schemas.openxmlformats.org/officeDocument/2006/relationships" xmlns:p="http://schemas.openxmlformats.org/presentationml/2006/main">
+  <p:cSld>
+    <p:spTree>
+      <p:nvGrpSpPr>
+        <p:cNvPr id="1" name=""/>
+        <p:cNvGrpSpPr/>
+        <p:nvPr/>
+      </p:nvGrpSpPr>
+      <p:grpSpPr>
+        <a:xfrm>
+          <a:off x="0" y="0"/>
+          <a:ext cx="0" cy="0"/>
+          <a:chOff x="0" y="0"/>
+          <a:chExt cx="0" cy="0"/>
+        </a:xfrm>
+      </p:grpSpPr>
+      <p:sp>
+        <p:nvSpPr>
+          <p:cNvPr id="2" name="Slide Image Placeholder 1"/>
+          <p:cNvSpPr>
+            <a:spLocks noGrp="1" noRot="1" noChangeAspect="1"/>
+          </p:cNvSpPr>
+          <p:nvPr>
+            <p:ph type="sldImg"/>
+          </p:nvPr>
+        </p:nvSpPr>
+        <p:spPr/>
+      </p:sp>
+      <p:sp>
+        <p:nvSpPr>
+          <p:cNvPr id="3" name="Notes Placeholder 2"/>
+          <p:cNvSpPr>
+            <a:spLocks noGrp="1"/>
+          </p:cNvSpPr>
+          <p:nvPr>
+            <p:ph type="body" idx="1"/>
+          </p:nvPr>
+        </p:nvSpPr>
+        <p:spPr/>
+        <p:txBody>
+          <a:bodyPr/>
+          <a:lstStyle/>
+          <a:p>
+            <a:r>
+              <a:rPr lang="en-GB" dirty="0" smtClean="0"/>
+              <a:t>I my simulations I have considered three different </a:t>
+            </a:r>
+            <a:r>
+              <a:rPr lang="en-GB" dirty="0" err="1" smtClean="0"/>
+              <a:t>lossy</a:t>
+            </a:r>
+            <a:r>
+              <a:rPr lang="en-GB" dirty="0" smtClean="0"/>
+              <a:t> layers.</a:t>
+            </a:r>
+            <a:r>
+              <a:rPr lang="en-GB" baseline="0" dirty="0" smtClean="0"/>
+              <a:t> They are created during different production steps and therefore have a different composition. </a:t>
+            </a:r>
+            <a:endParaRPr lang="en-GB" dirty="0"/>
+          </a:p>
+        </p:txBody>
+      </p:sp>
+      <p:sp>
+        <p:nvSpPr>
+          <p:cNvPr id="4" name="Slide Number Placeholder 3"/>
+          <p:cNvSpPr>
+            <a:spLocks noGrp="1"/>
+          </p:cNvSpPr>
+          <p:nvPr>
+            <p:ph type="sldNum" sz="quarter" idx="10"/>
+          </p:nvPr>
+        </p:nvSpPr>
+        <p:spPr/>
+        <p:txBody>
+          <a:bodyPr/>
+          <a:lstStyle/>
+          <a:p>
+            <a:fld id="{6E561419-CA27-4451-8C11-F1E3F24100C3}" type="slidenum">
+              <a:rPr lang="en-GB" smtClean="0"/>
+              <a:t>3</a:t>
+            </a:fld>
+            <a:endParaRPr lang="en-GB"/>
+          </a:p>
+        </p:txBody>
+      </p:sp>
+    </p:spTree>
+    <p:extLst>
+      <p:ext uri="{BB962C8B-B14F-4D97-AF65-F5344CB8AC3E}">
+        <p14:creationId xmlns:p14="http://schemas.microsoft.com/office/powerpoint/2010/main" val="3698495838"/>
+      </p:ext>
+    </p:extLst>
+  </p:cSld>
+  <p:clrMapOvr>
+    <a:masterClrMapping/>
+  </p:clrMapOvr>
+</p:notes>
+</file>
+
+<file path=ppt/notesSlides/notesSlide4.xml><?xml version="1.0" encoding="utf-8"?>
+<p:notes xmlns:a="http://schemas.openxmlformats.org/drawingml/2006/main" xmlns:r="http://schemas.openxmlformats.org/officeDocument/2006/relationships" xmlns:p="http://schemas.openxmlformats.org/presentationml/2006/main">
+  <p:cSld>
+    <p:spTree>
+      <p:nvGrpSpPr>
+        <p:cNvPr id="1" name=""/>
+        <p:cNvGrpSpPr/>
+        <p:nvPr/>
+      </p:nvGrpSpPr>
+      <p:grpSpPr>
+        <a:xfrm>
+          <a:off x="0" y="0"/>
+          <a:ext cx="0" cy="0"/>
+          <a:chOff x="0" y="0"/>
+          <a:chExt cx="0" cy="0"/>
+        </a:xfrm>
+      </p:grpSpPr>
+      <p:sp>
+        <p:nvSpPr>
+          <p:cNvPr id="2" name="Slide Image Placeholder 1"/>
+          <p:cNvSpPr>
+            <a:spLocks noGrp="1" noRot="1" noChangeAspect="1"/>
+          </p:cNvSpPr>
+          <p:nvPr>
+            <p:ph type="sldImg"/>
+          </p:nvPr>
+        </p:nvSpPr>
+        <p:spPr/>
+      </p:sp>
+      <p:sp>
+        <p:nvSpPr>
+          <p:cNvPr id="3" name="Notes Placeholder 2"/>
+          <p:cNvSpPr>
+            <a:spLocks noGrp="1"/>
+          </p:cNvSpPr>
+          <p:nvPr>
+            <p:ph type="body" idx="1"/>
+          </p:nvPr>
+        </p:nvSpPr>
+        <p:spPr/>
+        <p:txBody>
+          <a:bodyPr/>
+          <a:lstStyle/>
+          <a:p>
+            <a:r>
+              <a:rPr lang="en-GB" dirty="0" smtClean="0"/>
+              <a:t>Although the </a:t>
+            </a:r>
+            <a:r>
+              <a:rPr lang="en-GB" dirty="0" err="1" smtClean="0"/>
+              <a:t>lossy</a:t>
+            </a:r>
+            <a:r>
+              <a:rPr lang="en-GB" dirty="0" smtClean="0"/>
+              <a:t> layers are considered to have a relatively small thickness</a:t>
+            </a:r>
+            <a:r>
+              <a:rPr lang="en-GB" baseline="0" dirty="0" smtClean="0"/>
+              <a:t> of 3nm compared to the thickness of the pads of 100nm it is the high density of two-level systems the that make the dissipation of energy significant in these layers.</a:t>
+            </a:r>
+            <a:endParaRPr lang="en-GB" dirty="0"/>
+          </a:p>
+        </p:txBody>
+      </p:sp>
+      <p:sp>
+        <p:nvSpPr>
+          <p:cNvPr id="4" name="Slide Number Placeholder 3"/>
+          <p:cNvSpPr>
+            <a:spLocks noGrp="1"/>
+          </p:cNvSpPr>
+          <p:nvPr>
+            <p:ph type="sldNum" sz="quarter" idx="10"/>
+          </p:nvPr>
+        </p:nvSpPr>
+        <p:spPr/>
+        <p:txBody>
+          <a:bodyPr/>
+          <a:lstStyle/>
+          <a:p>
+            <a:fld id="{6E561419-CA27-4451-8C11-F1E3F24100C3}" type="slidenum">
+              <a:rPr lang="en-GB" smtClean="0"/>
+              <a:t>6</a:t>
+            </a:fld>
+            <a:endParaRPr lang="en-GB"/>
+          </a:p>
+        </p:txBody>
+      </p:sp>
+    </p:spTree>
+    <p:extLst>
+      <p:ext uri="{BB962C8B-B14F-4D97-AF65-F5344CB8AC3E}">
+        <p14:creationId xmlns:p14="http://schemas.microsoft.com/office/powerpoint/2010/main" val="1435651681"/>
+      </p:ext>
+    </p:extLst>
+  </p:cSld>
+  <p:clrMapOvr>
+    <a:masterClrMapping/>
+  </p:clrMapOvr>
+</p:notes>
+</file>
+
+<file path=ppt/notesSlides/notesSlide5.xml><?xml version="1.0" encoding="utf-8"?>
+<p:notes xmlns:a="http://schemas.openxmlformats.org/drawingml/2006/main" xmlns:r="http://schemas.openxmlformats.org/officeDocument/2006/relationships" xmlns:p="http://schemas.openxmlformats.org/presentationml/2006/main">
+  <p:cSld>
+    <p:spTree>
+      <p:nvGrpSpPr>
+        <p:cNvPr id="1" name=""/>
+        <p:cNvGrpSpPr/>
+        <p:nvPr/>
+      </p:nvGrpSpPr>
+      <p:grpSpPr>
+        <a:xfrm>
+          <a:off x="0" y="0"/>
+          <a:ext cx="0" cy="0"/>
+          <a:chOff x="0" y="0"/>
+          <a:chExt cx="0" cy="0"/>
+        </a:xfrm>
+      </p:grpSpPr>
+      <p:sp>
+        <p:nvSpPr>
+          <p:cNvPr id="2" name="Slide Image Placeholder 1"/>
+          <p:cNvSpPr>
+            <a:spLocks noGrp="1" noRot="1" noChangeAspect="1"/>
+          </p:cNvSpPr>
+          <p:nvPr>
+            <p:ph type="sldImg"/>
+          </p:nvPr>
+        </p:nvSpPr>
+        <p:spPr/>
+      </p:sp>
+      <p:sp>
+        <p:nvSpPr>
+          <p:cNvPr id="3" name="Notes Placeholder 2"/>
+          <p:cNvSpPr>
+            <a:spLocks noGrp="1"/>
+          </p:cNvSpPr>
+          <p:nvPr>
+            <p:ph type="body" idx="1"/>
+          </p:nvPr>
+        </p:nvSpPr>
+        <p:spPr/>
+        <p:txBody>
+          <a:bodyPr/>
+          <a:lstStyle/>
+          <a:p>
+            <a:endParaRPr lang="en-GB" dirty="0"/>
+          </a:p>
+        </p:txBody>
+      </p:sp>
+      <p:sp>
+        <p:nvSpPr>
+          <p:cNvPr id="4" name="Slide Number Placeholder 3"/>
+          <p:cNvSpPr>
+            <a:spLocks noGrp="1"/>
+          </p:cNvSpPr>
+          <p:nvPr>
+            <p:ph type="sldNum" sz="quarter" idx="10"/>
+          </p:nvPr>
+        </p:nvSpPr>
+        <p:spPr/>
+        <p:txBody>
+          <a:bodyPr/>
+          <a:lstStyle/>
+          <a:p>
+            <a:fld id="{6E561419-CA27-4451-8C11-F1E3F24100C3}" type="slidenum">
+              <a:rPr lang="en-GB" smtClean="0"/>
+              <a:t>8</a:t>
+            </a:fld>
+            <a:endParaRPr lang="en-GB"/>
+          </a:p>
+        </p:txBody>
+      </p:sp>
+    </p:spTree>
+    <p:extLst>
+      <p:ext uri="{BB962C8B-B14F-4D97-AF65-F5344CB8AC3E}">
+        <p14:creationId xmlns:p14="http://schemas.microsoft.com/office/powerpoint/2010/main" val="2532265099"/>
+      </p:ext>
+    </p:extLst>
+  </p:cSld>
+  <p:clrMapOvr>
+    <a:masterClrMapping/>
+  </p:clrMapOvr>
+</p:notes>
+</file>
+
+<file path=ppt/notesSlides/notesSlide6.xml><?xml version="1.0" encoding="utf-8"?>
+<p:notes xmlns:a="http://schemas.openxmlformats.org/drawingml/2006/main" xmlns:r="http://schemas.openxmlformats.org/officeDocument/2006/relationships" xmlns:p="http://schemas.openxmlformats.org/presentationml/2006/main">
+  <p:cSld>
+    <p:spTree>
+      <p:nvGrpSpPr>
+        <p:cNvPr id="1" name=""/>
+        <p:cNvGrpSpPr/>
+        <p:nvPr/>
+      </p:nvGrpSpPr>
+      <p:grpSpPr>
+        <a:xfrm>
+          <a:off x="0" y="0"/>
+          <a:ext cx="0" cy="0"/>
+          <a:chOff x="0" y="0"/>
+          <a:chExt cx="0" cy="0"/>
+        </a:xfrm>
+      </p:grpSpPr>
+      <p:sp>
+        <p:nvSpPr>
+          <p:cNvPr id="2" name="Slide Image Placeholder 1"/>
+          <p:cNvSpPr>
+            <a:spLocks noGrp="1" noRot="1" noChangeAspect="1"/>
+          </p:cNvSpPr>
+          <p:nvPr>
+            <p:ph type="sldImg"/>
+          </p:nvPr>
+        </p:nvSpPr>
+        <p:spPr/>
+      </p:sp>
+      <p:sp>
+        <p:nvSpPr>
+          <p:cNvPr id="3" name="Notes Placeholder 2"/>
+          <p:cNvSpPr>
+            <a:spLocks noGrp="1"/>
+          </p:cNvSpPr>
+          <p:nvPr>
+            <p:ph type="body" idx="1"/>
+          </p:nvPr>
+        </p:nvSpPr>
+        <p:spPr/>
+        <p:txBody>
+          <a:bodyPr/>
+          <a:lstStyle/>
+          <a:p>
+            <a:r>
+              <a:rPr lang="en-GB" dirty="0" smtClean="0"/>
+              <a:t>Because the</a:t>
+            </a:r>
+            <a:r>
+              <a:rPr lang="en-GB" baseline="0" dirty="0" smtClean="0"/>
+              <a:t> </a:t>
+            </a:r>
+            <a:r>
+              <a:rPr lang="en-GB" baseline="0" dirty="0" err="1" smtClean="0"/>
+              <a:t>lossy</a:t>
+            </a:r>
+            <a:r>
+              <a:rPr lang="en-GB" baseline="0" dirty="0" smtClean="0"/>
+              <a:t> layers are so thin compared to the rest of the system it would be undoable to consider them during the simulation in CST. Therefore the assumption is made that the </a:t>
+            </a:r>
+            <a:r>
+              <a:rPr lang="en-GB" baseline="0" dirty="0" err="1" smtClean="0"/>
+              <a:t>lossy</a:t>
+            </a:r>
+            <a:r>
+              <a:rPr lang="en-GB" baseline="0" dirty="0" smtClean="0"/>
+              <a:t> layers do not change the electric field.</a:t>
+            </a:r>
+            <a:endParaRPr lang="en-GB" dirty="0"/>
+          </a:p>
+        </p:txBody>
+      </p:sp>
+      <p:sp>
+        <p:nvSpPr>
+          <p:cNvPr id="4" name="Slide Number Placeholder 3"/>
+          <p:cNvSpPr>
+            <a:spLocks noGrp="1"/>
+          </p:cNvSpPr>
+          <p:nvPr>
+            <p:ph type="sldNum" sz="quarter" idx="10"/>
+          </p:nvPr>
+        </p:nvSpPr>
+        <p:spPr/>
+        <p:txBody>
+          <a:bodyPr/>
+          <a:lstStyle/>
+          <a:p>
+            <a:fld id="{6E561419-CA27-4451-8C11-F1E3F24100C3}" type="slidenum">
+              <a:rPr lang="en-GB" smtClean="0"/>
+              <a:t>9</a:t>
+            </a:fld>
+            <a:endParaRPr lang="en-GB"/>
+          </a:p>
+        </p:txBody>
+      </p:sp>
+    </p:spTree>
+    <p:extLst>
+      <p:ext uri="{BB962C8B-B14F-4D97-AF65-F5344CB8AC3E}">
+        <p14:creationId xmlns:p14="http://schemas.microsoft.com/office/powerpoint/2010/main" val="4254708948"/>
+      </p:ext>
+    </p:extLst>
+  </p:cSld>
+  <p:clrMapOvr>
+    <a:masterClrMapping/>
+  </p:clrMapOvr>
+</p:notes>
+</file>
+
+<file path=ppt/notesSlides/notesSlide7.xml><?xml version="1.0" encoding="utf-8"?>
+<p:notes xmlns:a="http://schemas.openxmlformats.org/drawingml/2006/main" xmlns:r="http://schemas.openxmlformats.org/officeDocument/2006/relationships" xmlns:p="http://schemas.openxmlformats.org/presentationml/2006/main">
+  <p:cSld>
+    <p:spTree>
+      <p:nvGrpSpPr>
+        <p:cNvPr id="1" name=""/>
+        <p:cNvGrpSpPr/>
+        <p:nvPr/>
+      </p:nvGrpSpPr>
+      <p:grpSpPr>
+        <a:xfrm>
+          <a:off x="0" y="0"/>
+          <a:ext cx="0" cy="0"/>
+          <a:chOff x="0" y="0"/>
+          <a:chExt cx="0" cy="0"/>
+        </a:xfrm>
+      </p:grpSpPr>
+      <p:sp>
+        <p:nvSpPr>
+          <p:cNvPr id="2" name="Slide Image Placeholder 1"/>
+          <p:cNvSpPr>
+            <a:spLocks noGrp="1" noRot="1" noChangeAspect="1"/>
+          </p:cNvSpPr>
+          <p:nvPr>
+            <p:ph type="sldImg"/>
+          </p:nvPr>
+        </p:nvSpPr>
+        <p:spPr/>
+      </p:sp>
+      <p:sp>
+        <p:nvSpPr>
+          <p:cNvPr id="3" name="Notes Placeholder 2"/>
+          <p:cNvSpPr>
+            <a:spLocks noGrp="1"/>
+          </p:cNvSpPr>
+          <p:nvPr>
+            <p:ph type="body" idx="1"/>
+          </p:nvPr>
+        </p:nvSpPr>
+        <p:spPr/>
+        <p:txBody>
+          <a:bodyPr/>
+          <a:lstStyle/>
+          <a:p>
+            <a:r>
+              <a:rPr lang="en-GB" dirty="0" smtClean="0"/>
+              <a:t>Having made this assumption for the simulation</a:t>
+            </a:r>
+            <a:r>
+              <a:rPr lang="en-GB" baseline="0" dirty="0" smtClean="0"/>
+              <a:t> of the qubit it is still necessary to consider the difference in dielectric constants. The amplitude of the field inside the areas containing </a:t>
+            </a:r>
+            <a:r>
+              <a:rPr lang="en-GB" baseline="0" dirty="0" err="1" smtClean="0"/>
+              <a:t>lossy</a:t>
+            </a:r>
+            <a:r>
+              <a:rPr lang="en-GB" baseline="0" dirty="0" smtClean="0"/>
+              <a:t> material is changed accordingly. </a:t>
+            </a:r>
+            <a:endParaRPr lang="en-GB" dirty="0"/>
+          </a:p>
+        </p:txBody>
+      </p:sp>
+      <p:sp>
+        <p:nvSpPr>
+          <p:cNvPr id="4" name="Slide Number Placeholder 3"/>
+          <p:cNvSpPr>
+            <a:spLocks noGrp="1"/>
+          </p:cNvSpPr>
+          <p:nvPr>
+            <p:ph type="sldNum" sz="quarter" idx="10"/>
+          </p:nvPr>
+        </p:nvSpPr>
+        <p:spPr/>
+        <p:txBody>
+          <a:bodyPr/>
+          <a:lstStyle/>
+          <a:p>
+            <a:fld id="{6E561419-CA27-4451-8C11-F1E3F24100C3}" type="slidenum">
+              <a:rPr lang="en-GB" smtClean="0"/>
+              <a:t>10</a:t>
+            </a:fld>
+            <a:endParaRPr lang="en-GB"/>
+          </a:p>
+        </p:txBody>
+      </p:sp>
+    </p:spTree>
+    <p:extLst>
+      <p:ext uri="{BB962C8B-B14F-4D97-AF65-F5344CB8AC3E}">
+        <p14:creationId xmlns:p14="http://schemas.microsoft.com/office/powerpoint/2010/main" val="1361738719"/>
+      </p:ext>
+    </p:extLst>
+  </p:cSld>
+  <p:clrMapOvr>
+    <a:masterClrMapping/>
+  </p:clrMapOvr>
+</p:notes>
+</file>
+
+<file path=ppt/notesSlides/notesSlide8.xml><?xml version="1.0" encoding="utf-8"?>
+<p:notes xmlns:a="http://schemas.openxmlformats.org/drawingml/2006/main" xmlns:r="http://schemas.openxmlformats.org/officeDocument/2006/relationships" xmlns:p="http://schemas.openxmlformats.org/presentationml/2006/main">
+  <p:cSld>
+    <p:spTree>
+      <p:nvGrpSpPr>
+        <p:cNvPr id="1" name=""/>
+        <p:cNvGrpSpPr/>
+        <p:nvPr/>
+      </p:nvGrpSpPr>
+      <p:grpSpPr>
+        <a:xfrm>
+          <a:off x="0" y="0"/>
+          <a:ext cx="0" cy="0"/>
+          <a:chOff x="0" y="0"/>
+          <a:chExt cx="0" cy="0"/>
+        </a:xfrm>
+      </p:grpSpPr>
+      <p:sp>
+        <p:nvSpPr>
+          <p:cNvPr id="2" name="Slide Image Placeholder 1"/>
+          <p:cNvSpPr>
+            <a:spLocks noGrp="1" noRot="1" noChangeAspect="1"/>
+          </p:cNvSpPr>
+          <p:nvPr>
+            <p:ph type="sldImg"/>
+          </p:nvPr>
+        </p:nvSpPr>
+        <p:spPr/>
+      </p:sp>
+      <p:sp>
+        <p:nvSpPr>
+          <p:cNvPr id="3" name="Notes Placeholder 2"/>
+          <p:cNvSpPr>
+            <a:spLocks noGrp="1"/>
+          </p:cNvSpPr>
+          <p:nvPr>
+            <p:ph type="body" idx="1"/>
+          </p:nvPr>
+        </p:nvSpPr>
+        <p:spPr/>
+        <p:txBody>
+          <a:bodyPr/>
+          <a:lstStyle/>
+          <a:p>
+            <a:r>
+              <a:rPr lang="en-GB" dirty="0" smtClean="0"/>
+              <a:t>https://farside.ph.utexas.edu/teaching/jk1/lectures/node112.html</a:t>
+            </a:r>
+          </a:p>
+          <a:p>
+            <a:r>
+              <a:rPr lang="en-GB" smtClean="0"/>
+              <a:t>https://books.google.nl/books?id=mll47bVO29gC&amp;pg=PA1415&amp;lpg=PA1415&amp;dq=tangential+electric+field+superconductor+high+frequency&amp;source=bl&amp;ots=CdOO-SKSTM&amp;sig=WD6728zQIlr839oagMkSicv-3ps&amp;hl=en&amp;sa=X&amp;ved=0ahUKEwiHlOG34YLNAhWKKcAKHbGSDBAQ6AEIKTAB#v=onepage&amp;q=tangential%20electric%20field%20superconductor%20high%20frequency&amp;f=false</a:t>
+            </a:r>
+            <a:endParaRPr lang="en-GB" dirty="0"/>
+          </a:p>
+        </p:txBody>
+      </p:sp>
+      <p:sp>
+        <p:nvSpPr>
+          <p:cNvPr id="4" name="Slide Number Placeholder 3"/>
+          <p:cNvSpPr>
+            <a:spLocks noGrp="1"/>
+          </p:cNvSpPr>
+          <p:nvPr>
+            <p:ph type="sldNum" sz="quarter" idx="10"/>
+          </p:nvPr>
+        </p:nvSpPr>
+        <p:spPr/>
+        <p:txBody>
+          <a:bodyPr/>
+          <a:lstStyle/>
+          <a:p>
+            <a:fld id="{6E561419-CA27-4451-8C11-F1E3F24100C3}" type="slidenum">
+              <a:rPr lang="en-GB" smtClean="0"/>
+              <a:t>11</a:t>
+            </a:fld>
+            <a:endParaRPr lang="en-GB"/>
+          </a:p>
+        </p:txBody>
+      </p:sp>
+    </p:spTree>
+    <p:extLst>
+      <p:ext uri="{BB962C8B-B14F-4D97-AF65-F5344CB8AC3E}">
+        <p14:creationId xmlns:p14="http://schemas.microsoft.com/office/powerpoint/2010/main" val="2083172088"/>
+      </p:ext>
+    </p:extLst>
+  </p:cSld>
+  <p:clrMapOvr>
+    <a:masterClrMapping/>
+  </p:clrMapOvr>
+</p:notes>
+</file>
+
+<file path=ppt/notesSlides/notesSlide9.xml><?xml version="1.0" encoding="utf-8"?>
+<p:notes xmlns:a="http://schemas.openxmlformats.org/drawingml/2006/main" xmlns:r="http://schemas.openxmlformats.org/officeDocument/2006/relationships" xmlns:p="http://schemas.openxmlformats.org/presentationml/2006/main">
+  <p:cSld>
+    <p:spTree>
+      <p:nvGrpSpPr>
+        <p:cNvPr id="1" name=""/>
+        <p:cNvGrpSpPr/>
+        <p:nvPr/>
+      </p:nvGrpSpPr>
+      <p:grpSpPr>
+        <a:xfrm>
+          <a:off x="0" y="0"/>
+          <a:ext cx="0" cy="0"/>
+          <a:chOff x="0" y="0"/>
+          <a:chExt cx="0" cy="0"/>
+        </a:xfrm>
+      </p:grpSpPr>
+      <p:sp>
+        <p:nvSpPr>
+          <p:cNvPr id="2" name="Slide Image Placeholder 1"/>
+          <p:cNvSpPr>
+            <a:spLocks noGrp="1" noRot="1" noChangeAspect="1"/>
+          </p:cNvSpPr>
+          <p:nvPr>
+            <p:ph type="sldImg"/>
+          </p:nvPr>
+        </p:nvSpPr>
+        <p:spPr/>
+      </p:sp>
+      <p:sp>
+        <p:nvSpPr>
+          <p:cNvPr id="3" name="Notes Placeholder 2"/>
+          <p:cNvSpPr>
+            <a:spLocks noGrp="1"/>
+          </p:cNvSpPr>
+          <p:nvPr>
+            <p:ph type="body" idx="1"/>
+          </p:nvPr>
+        </p:nvSpPr>
+        <p:spPr/>
+        <p:txBody>
+          <a:bodyPr/>
+          <a:lstStyle/>
+          <a:p>
+            <a:r>
+              <a:rPr lang="en-GB" dirty="0" smtClean="0"/>
               <a:t>E = h*v</a:t>
             </a:r>
           </a:p>
@@ -1432,7 +2234,7 @@
           <a:p>
             <a:fld id="{462A2416-1570-3849-86F9-07F78746E1B2}" type="datetimeFigureOut">
               <a:rPr lang="en-US" smtClean="0"/>
-              <a:t>3/10/2016</a:t>
+              <a:t>5/30/2016</a:t>
             </a:fld>
             <a:endParaRPr lang="en-US" dirty="0"/>
           </a:p>
@@ -2773,7 +3575,7 @@
             <a:pPr algn="l"/>
             <a:r>
               <a:rPr lang="en-US" dirty="0" smtClean="0"/>
-              <a:t>Progress meeting</a:t>
+              <a:t>A procedure to calculate participation ratios</a:t>
             </a:r>
             <a:endParaRPr lang="en-US" dirty="0">
               <a:latin typeface="Arial"/>
@@ -3653,7 +4455,7 @@
             </p:nvSpPr>
             <p:spPr>
               <a:blipFill rotWithShape="1">
-                <a:blip r:embed="rId2"/>
+                <a:blip r:embed="rId3"/>
                 <a:stretch>
                   <a:fillRect l="-1715" t="-1312" b="-1575"/>
                 </a:stretch>
@@ -3734,8 +4536,8 @@
           </a:p>
         </p:txBody>
       </p:sp>
-      <mc:AlternateContent xmlns:mc="http://schemas.openxmlformats.org/markup-compatibility/2006" xmlns:a14="http://schemas.microsoft.com/office/drawing/2010/main">
-        <mc:Choice Requires="a14">
+      <mc:AlternateContent xmlns:mc="http://schemas.openxmlformats.org/markup-compatibility/2006">
+        <mc:Choice xmlns:a14="http://schemas.microsoft.com/office/drawing/2010/main" Requires="a14">
           <p:sp>
             <p:nvSpPr>
               <p:cNvPr id="3" name="Content Placeholder 2"/>
@@ -3781,10 +4583,10 @@
                         </m:sSubPr>
                         <m:e>
                           <m:r>
-                            <a:rPr lang="en-GB" i="1">
+                            <a:rPr lang="en-GB" b="0" i="1" smtClean="0">
                               <a:latin typeface="Cambria Math"/>
                             </a:rPr>
-                            <m:t>𝑄</m:t>
+                            <m:t>𝐸</m:t>
                           </m:r>
                         </m:e>
                         <m:sub>
@@ -3921,18 +4723,30 @@
                                   <m:sSub>
                                     <m:sSubPr>
                                       <m:ctrlPr>
-                                        <a:rPr lang="en-GB" i="1">
+                                        <a:rPr lang="en-GB" i="1" smtClean="0">
                                           <a:latin typeface="Cambria Math"/>
                                         </a:rPr>
                                       </m:ctrlPr>
                                     </m:sSubPr>
                                     <m:e>
-                                      <m:r>
-                                        <a:rPr lang="en-GB" i="1">
-                                          <a:latin typeface="Cambria Math"/>
-                                        </a:rPr>
-                                        <m:t>𝐸</m:t>
-                                      </m:r>
+                                      <m:acc>
+                                        <m:accPr>
+                                          <m:chr m:val="̅"/>
+                                          <m:ctrlPr>
+                                            <a:rPr lang="en-GB" i="1">
+                                              <a:latin typeface="Cambria Math"/>
+                                            </a:rPr>
+                                          </m:ctrlPr>
+                                        </m:accPr>
+                                        <m:e>
+                                          <m:r>
+                                            <a:rPr lang="en-GB" i="1">
+                                              <a:latin typeface="Cambria Math"/>
+                                            </a:rPr>
+                                            <m:t>𝐸</m:t>
+                                          </m:r>
+                                        </m:e>
+                                      </m:acc>
                                     </m:e>
                                     <m:sub>
                                       <m:r>
@@ -3994,10 +4808,10 @@
                         </m:sSubPr>
                         <m:e>
                           <m:r>
-                            <a:rPr lang="en-GB" i="1">
+                            <a:rPr lang="en-GB" b="0" i="1" smtClean="0">
                               <a:latin typeface="Cambria Math"/>
                             </a:rPr>
-                            <m:t>𝑄</m:t>
+                            <m:t>𝐸</m:t>
                           </m:r>
                         </m:e>
                         <m:sub>
@@ -4195,12 +5009,24 @@
                                       </m:ctrlPr>
                                     </m:sSubPr>
                                     <m:e>
-                                      <m:r>
-                                        <a:rPr lang="en-GB" i="1">
-                                          <a:latin typeface="Cambria Math"/>
-                                        </a:rPr>
-                                        <m:t>𝐸</m:t>
-                                      </m:r>
+                                      <m:acc>
+                                        <m:accPr>
+                                          <m:chr m:val="̅"/>
+                                          <m:ctrlPr>
+                                            <a:rPr lang="en-GB" i="1">
+                                              <a:latin typeface="Cambria Math"/>
+                                            </a:rPr>
+                                          </m:ctrlPr>
+                                        </m:accPr>
+                                        <m:e>
+                                          <m:r>
+                                            <a:rPr lang="en-GB" i="1">
+                                              <a:latin typeface="Cambria Math"/>
+                                            </a:rPr>
+                                            <m:t>𝐸</m:t>
+                                          </m:r>
+                                        </m:e>
+                                      </m:acc>
                                     </m:e>
                                     <m:sub>
                                       <m:r>
@@ -4262,10 +5088,10 @@
                         </m:sSubPr>
                         <m:e>
                           <m:r>
-                            <a:rPr lang="en-GB" i="1">
+                            <a:rPr lang="en-GB" b="0" i="1" smtClean="0">
                               <a:latin typeface="Cambria Math"/>
                             </a:rPr>
-                            <m:t>𝑄</m:t>
+                            <m:t>𝐸</m:t>
                           </m:r>
                         </m:e>
                         <m:sub>
@@ -4408,12 +5234,24 @@
                                       </m:ctrlPr>
                                     </m:sSubPr>
                                     <m:e>
-                                      <m:r>
-                                        <a:rPr lang="en-GB" i="1">
-                                          <a:latin typeface="Cambria Math"/>
-                                        </a:rPr>
-                                        <m:t>𝐸</m:t>
-                                      </m:r>
+                                      <m:acc>
+                                        <m:accPr>
+                                          <m:chr m:val="̅"/>
+                                          <m:ctrlPr>
+                                            <a:rPr lang="en-GB" i="1">
+                                              <a:latin typeface="Cambria Math"/>
+                                            </a:rPr>
+                                          </m:ctrlPr>
+                                        </m:accPr>
+                                        <m:e>
+                                          <m:r>
+                                            <a:rPr lang="en-GB" i="1">
+                                              <a:latin typeface="Cambria Math"/>
+                                            </a:rPr>
+                                            <m:t>𝐸</m:t>
+                                          </m:r>
+                                        </m:e>
+                                      </m:acc>
                                     </m:e>
                                     <m:sub>
                                       <m:r>
@@ -4574,12 +5412,24 @@
                                       </m:ctrlPr>
                                     </m:sSubPr>
                                     <m:e>
-                                      <m:r>
-                                        <a:rPr lang="en-GB" i="1">
-                                          <a:latin typeface="Cambria Math"/>
-                                        </a:rPr>
-                                        <m:t>𝐸</m:t>
-                                      </m:r>
+                                      <m:acc>
+                                        <m:accPr>
+                                          <m:chr m:val="̅"/>
+                                          <m:ctrlPr>
+                                            <a:rPr lang="en-GB" i="1">
+                                              <a:latin typeface="Cambria Math"/>
+                                            </a:rPr>
+                                          </m:ctrlPr>
+                                        </m:accPr>
+                                        <m:e>
+                                          <m:r>
+                                            <a:rPr lang="en-GB" i="1">
+                                              <a:latin typeface="Cambria Math"/>
+                                            </a:rPr>
+                                            <m:t>𝐸</m:t>
+                                          </m:r>
+                                        </m:e>
+                                      </m:acc>
                                     </m:e>
                                     <m:sub>
                                       <m:r>
@@ -4624,7 +5474,7 @@
             </p:txBody>
           </p:sp>
         </mc:Choice>
-        <mc:Fallback xmlns="">
+        <mc:Fallback>
           <p:sp>
             <p:nvSpPr>
               <p:cNvPr id="3" name="Content Placeholder 2"/>
@@ -4637,7 +5487,7 @@
             </p:nvSpPr>
             <p:spPr>
               <a:blipFill rotWithShape="1">
-                <a:blip r:embed="rId2"/>
+                <a:blip r:embed="rId3"/>
                 <a:stretch>
                   <a:fillRect l="-1458" t="-1181"/>
                 </a:stretch>
@@ -4718,8 +5568,8 @@
           </a:p>
         </p:txBody>
       </p:sp>
-      <mc:AlternateContent xmlns:mc="http://schemas.openxmlformats.org/markup-compatibility/2006" xmlns:a14="http://schemas.microsoft.com/office/drawing/2010/main">
-        <mc:Choice Requires="a14">
+      <mc:AlternateContent xmlns:mc="http://schemas.openxmlformats.org/markup-compatibility/2006">
+        <mc:Choice xmlns:a14="http://schemas.microsoft.com/office/drawing/2010/main" Requires="a14">
           <p:sp>
             <p:nvSpPr>
               <p:cNvPr id="3" name="Content Placeholder 2"/>
@@ -4757,7 +5607,7 @@
                           <a:rPr lang="en-GB" b="0" i="1" smtClean="0">
                             <a:latin typeface="Cambria Math"/>
                           </a:rPr>
-                          <m:t>𝑄</m:t>
+                          <m:t>𝐸</m:t>
                         </m:r>
                       </m:e>
                       <m:sub>
@@ -4773,13 +5623,29 @@
                 </a14:m>
                 <a:r>
                   <a:rPr lang="en-GB" dirty="0" smtClean="0"/>
-                  <a:t>, it is possible to determine the influence design parameters (pad separation, corner radius)  and/or changing overall qubit design (Yale, IBM) on participation ratio.</a:t>
+                  <a:t>, it is possible to determine the </a:t>
+                </a:r>
+                <a:r>
+                  <a:rPr lang="en-GB" dirty="0" smtClean="0"/>
+                  <a:t>influence certain </a:t>
+                </a:r>
+                <a:r>
+                  <a:rPr lang="en-GB" dirty="0" smtClean="0"/>
+                  <a:t>design parameters (pad separation, corner radius)  and/or changing overall qubit design </a:t>
+                </a:r>
+                <a:r>
+                  <a:rPr lang="en-GB" dirty="0" smtClean="0"/>
+                  <a:t>(interdigitated, padded) </a:t>
+                </a:r>
+                <a:r>
+                  <a:rPr lang="en-GB" dirty="0" smtClean="0"/>
+                  <a:t>on participation ratio.</a:t>
                 </a:r>
               </a:p>
             </p:txBody>
           </p:sp>
         </mc:Choice>
-        <mc:Fallback xmlns="">
+        <mc:Fallback>
           <p:sp>
             <p:nvSpPr>
               <p:cNvPr id="3" name="Content Placeholder 2"/>
@@ -4794,7 +5660,7 @@
               <a:blipFill rotWithShape="1">
                 <a:blip r:embed="rId2"/>
                 <a:stretch>
-                  <a:fillRect l="-1715" t="-1312" r="-772"/>
+                  <a:fillRect l="-1715" t="-1312" r="-2487"/>
                 </a:stretch>
               </a:blipFill>
             </p:spPr>
@@ -5543,11 +6409,11 @@
   <p:clrMapOvr>
     <a:masterClrMapping/>
   </p:clrMapOvr>
-  <mc:AlternateContent xmlns:mc="http://schemas.openxmlformats.org/markup-compatibility/2006">
-    <mc:Choice xmlns:p14="http://schemas.microsoft.com/office/powerpoint/2010/main" Requires="p14">
+  <mc:AlternateContent xmlns:mc="http://schemas.openxmlformats.org/markup-compatibility/2006" xmlns:p14="http://schemas.microsoft.com/office/powerpoint/2010/main">
+    <mc:Choice Requires="p14">
       <p:transition spd="slow" p14:dur="2000"/>
     </mc:Choice>
-    <mc:Fallback>
+    <mc:Fallback xmlns="">
       <p:transition spd="slow"/>
     </mc:Fallback>
   </mc:AlternateContent>
@@ -6551,7 +7417,6 @@
               <a:rPr lang="en-GB" dirty="0"/>
               <a:t>Simulation - Meshing</a:t>
             </a:r>
-            <a:endParaRPr lang="en-GB" dirty="0"/>
           </a:p>
         </p:txBody>
       </p:sp>
@@ -6640,7 +7505,6 @@
               <a:rPr lang="en-GB" dirty="0"/>
               <a:t>Simulation - Meshing</a:t>
             </a:r>
-            <a:endParaRPr lang="en-GB" dirty="0"/>
           </a:p>
         </p:txBody>
       </p:sp>
@@ -7508,20 +8372,41 @@
           <a:p>
             <a:r>
               <a:rPr lang="en-US" dirty="0" smtClean="0"/>
-              <a:t>Metal-Vacuum interface (MV)</a:t>
-            </a:r>
-          </a:p>
-          <a:p>
+              <a:t>Metal-Vacuum interface (MV</a:t>
+            </a:r>
             <a:r>
               <a:rPr lang="en-US" dirty="0" smtClean="0"/>
-              <a:t>Metal-Substrate interface (MS)</a:t>
+              <a:t>)</a:t>
             </a:r>
           </a:p>
           <a:p>
             <a:r>
               <a:rPr lang="en-US" dirty="0" smtClean="0"/>
-              <a:t>Substrate-Vacuum (SV)</a:t>
-            </a:r>
+              <a:t>Metal-Substrate </a:t>
+            </a:r>
+            <a:r>
+              <a:rPr lang="en-US" dirty="0" smtClean="0"/>
+              <a:t>interface (MS</a:t>
+            </a:r>
+            <a:r>
+              <a:rPr lang="en-US" dirty="0" smtClean="0"/>
+              <a:t>)</a:t>
+            </a:r>
+          </a:p>
+          <a:p>
+            <a:r>
+              <a:rPr lang="en-US" dirty="0" smtClean="0"/>
+              <a:t>Substrate-Vacuum </a:t>
+            </a:r>
+            <a:r>
+              <a:rPr lang="en-US" dirty="0" smtClean="0"/>
+              <a:t>(SV</a:t>
+            </a:r>
+            <a:r>
+              <a:rPr lang="en-US" dirty="0" smtClean="0"/>
+              <a:t>)</a:t>
+            </a:r>
+            <a:endParaRPr lang="en-US" dirty="0" smtClean="0"/>
           </a:p>
           <a:p>
             <a:pPr marL="0" indent="0">
@@ -8728,7 +9613,7 @@
 </file>
 
 <file path=ppt/slides/slide5.xml><?xml version="1.0" encoding="utf-8"?>
-<p:sld xmlns:a="http://schemas.openxmlformats.org/drawingml/2006/main" xmlns:r="http://schemas.openxmlformats.org/officeDocument/2006/relationships" xmlns:p="http://schemas.openxmlformats.org/presentationml/2006/main">
+<p:sld xmlns:a="http://schemas.openxmlformats.org/drawingml/2006/main" xmlns:r="http://schemas.openxmlformats.org/officeDocument/2006/relationships" xmlns:p="http://schemas.openxmlformats.org/presentationml/2006/main" show="0">
   <p:cSld>
     <p:spTree>
       <p:nvGrpSpPr>
@@ -8810,6 +9695,14 @@
   <p:clrMapOvr>
     <a:masterClrMapping/>
   </p:clrMapOvr>
+  <mc:AlternateContent xmlns:mc="http://schemas.openxmlformats.org/markup-compatibility/2006">
+    <mc:Choice xmlns:p14="http://schemas.microsoft.com/office/powerpoint/2010/main" Requires="p14">
+      <p:transition spd="slow" p14:dur="2000"/>
+    </mc:Choice>
+    <mc:Fallback>
+      <p:transition spd="slow"/>
+    </mc:Fallback>
+  </mc:AlternateContent>
   <p:timing>
     <p:tnLst>
       <p:par>
@@ -8973,8 +9866,8 @@
           </a:p>
         </p:txBody>
       </p:sp>
-      <mc:AlternateContent xmlns:mc="http://schemas.openxmlformats.org/markup-compatibility/2006" xmlns:a14="http://schemas.microsoft.com/office/drawing/2010/main">
-        <mc:Choice Requires="a14">
+      <mc:AlternateContent xmlns:mc="http://schemas.openxmlformats.org/markup-compatibility/2006">
+        <mc:Choice xmlns:a14="http://schemas.microsoft.com/office/drawing/2010/main" Requires="a14">
           <p:sp>
             <p:nvSpPr>
               <p:cNvPr id="3" name="Content Placeholder 2"/>
@@ -9084,11 +9977,11 @@
                 </a:pPr>
                 <a:r>
                   <a:rPr lang="en-GB" dirty="0" smtClean="0"/>
-                  <a:t>Metal-Substrate: Si-</a:t>
+                  <a:t>Metal-Substrate: </a:t>
                 </a:r>
                 <a:r>
-                  <a:rPr lang="en-GB" dirty="0" err="1" smtClean="0"/>
-                  <a:t>nitrade</a:t>
+                  <a:rPr lang="en-GB" dirty="0" smtClean="0"/>
+                  <a:t>Si-nitride</a:t>
                 </a:r>
                 <a:endParaRPr lang="en-GB" dirty="0" smtClean="0"/>
               </a:p>
@@ -9212,7 +10105,7 @@
             </p:txBody>
           </p:sp>
         </mc:Choice>
-        <mc:Fallback xmlns="">
+        <mc:Fallback>
           <p:sp>
             <p:nvSpPr>
               <p:cNvPr id="3" name="Content Placeholder 2"/>
@@ -9306,8 +10199,8 @@
           </a:p>
         </p:txBody>
       </p:sp>
-      <mc:AlternateContent xmlns:mc="http://schemas.openxmlformats.org/markup-compatibility/2006" xmlns:a14="http://schemas.microsoft.com/office/drawing/2010/main">
-        <mc:Choice Requires="a14">
+      <mc:AlternateContent xmlns:mc="http://schemas.openxmlformats.org/markup-compatibility/2006">
+        <mc:Choice xmlns:a14="http://schemas.microsoft.com/office/drawing/2010/main" Requires="a14">
           <p:sp>
             <p:nvSpPr>
               <p:cNvPr id="3" name="Content Placeholder 2"/>
@@ -9510,7 +10403,7 @@
             </p:txBody>
           </p:sp>
         </mc:Choice>
-        <mc:Fallback xmlns="">
+        <mc:Fallback>
           <p:sp>
             <p:nvSpPr>
               <p:cNvPr id="3" name="Content Placeholder 2"/>
@@ -9523,7 +10416,7 @@
             </p:nvSpPr>
             <p:spPr>
               <a:blipFill rotWithShape="1">
-                <a:blip r:embed="rId2"/>
+                <a:blip r:embed="rId3"/>
                 <a:stretch>
                   <a:fillRect l="-1715" t="-1312"/>
                 </a:stretch>
@@ -9861,7 +10754,7 @@
             </p:nvSpPr>
             <p:spPr>
               <a:blipFill rotWithShape="1">
-                <a:blip r:embed="rId2"/>
+                <a:blip r:embed="rId3"/>
                 <a:stretch>
                   <a:fillRect l="-1715" t="-1312"/>
                 </a:stretch>

</xml_diff>

<commit_message>
Update theory, start using feedback
</commit_message>
<xml_diff>
--- a/Thesis/progress meeting presentation.pptx
+++ b/Thesis/progress meeting presentation.pptx
@@ -232,7 +232,7 @@
           <a:p>
             <a:fld id="{DBAE3B3E-782A-9745-8E84-372F7B6771BF}" type="datetimeFigureOut">
               <a:rPr lang="en-US" smtClean="0"/>
-              <a:t>5/30/2016</a:t>
+              <a:t>7/26/2016</a:t>
             </a:fld>
             <a:endParaRPr lang="en-US" dirty="0"/>
           </a:p>
@@ -397,7 +397,7 @@
           <a:p>
             <a:fld id="{2D2F14E1-C5B1-40B4-8FD5-AE5FDC1E5B73}" type="datetimeFigureOut">
               <a:rPr lang="en-GB" smtClean="0"/>
-              <a:t>30/05/2016</a:t>
+              <a:t>26/07/2016</a:t>
             </a:fld>
             <a:endParaRPr lang="en-GB"/>
           </a:p>
@@ -2234,7 +2234,7 @@
           <a:p>
             <a:fld id="{462A2416-1570-3849-86F9-07F78746E1B2}" type="datetimeFigureOut">
               <a:rPr lang="en-US" smtClean="0"/>
-              <a:t>5/30/2016</a:t>
+              <a:t>7/26/2016</a:t>
             </a:fld>
             <a:endParaRPr lang="en-US" dirty="0"/>
           </a:p>
@@ -3644,8 +3644,8 @@
           </a:p>
         </p:txBody>
       </p:sp>
-      <mc:AlternateContent xmlns:mc="http://schemas.openxmlformats.org/markup-compatibility/2006" xmlns:a14="http://schemas.microsoft.com/office/drawing/2010/main">
-        <mc:Choice Requires="a14">
+      <mc:AlternateContent xmlns:mc="http://schemas.openxmlformats.org/markup-compatibility/2006">
+        <mc:Choice xmlns:a14="http://schemas.microsoft.com/office/drawing/2010/main" Requires="a14">
           <p:sp>
             <p:nvSpPr>
               <p:cNvPr id="3" name="Content Placeholder 2"/>
@@ -3744,7 +3744,16 @@
                               </a:solidFill>
                               <a:latin typeface="Cambria Math"/>
                             </a:rPr>
-                            <m:t>𝑀𝑉</m:t>
+                            <m:t>𝑀</m:t>
+                          </m:r>
+                          <m:r>
+                            <a:rPr lang="en-GB" b="0" i="1" smtClean="0">
+                              <a:solidFill>
+                                <a:srgbClr val="FF0000"/>
+                              </a:solidFill>
+                              <a:latin typeface="Cambria Math"/>
+                            </a:rPr>
+                            <m:t>𝐴</m:t>
                           </m:r>
                         </m:sub>
                       </m:sSub>
@@ -4442,7 +4451,7 @@
             </p:txBody>
           </p:sp>
         </mc:Choice>
-        <mc:Fallback xmlns="">
+        <mc:Fallback>
           <p:sp>
             <p:nvSpPr>
               <p:cNvPr id="3" name="Content Placeholder 2"/>
@@ -4536,8 +4545,8 @@
           </a:p>
         </p:txBody>
       </p:sp>
-      <mc:AlternateContent xmlns:mc="http://schemas.openxmlformats.org/markup-compatibility/2006">
-        <mc:Choice xmlns:a14="http://schemas.microsoft.com/office/drawing/2010/main" Requires="a14">
+      <mc:AlternateContent xmlns:mc="http://schemas.openxmlformats.org/markup-compatibility/2006" xmlns:a14="http://schemas.microsoft.com/office/drawing/2010/main">
+        <mc:Choice Requires="a14">
           <p:sp>
             <p:nvSpPr>
               <p:cNvPr id="3" name="Content Placeholder 2"/>
@@ -5474,7 +5483,7 @@
             </p:txBody>
           </p:sp>
         </mc:Choice>
-        <mc:Fallback>
+        <mc:Fallback xmlns="">
           <p:sp>
             <p:nvSpPr>
               <p:cNvPr id="3" name="Content Placeholder 2"/>
@@ -5568,8 +5577,8 @@
           </a:p>
         </p:txBody>
       </p:sp>
-      <mc:AlternateContent xmlns:mc="http://schemas.openxmlformats.org/markup-compatibility/2006">
-        <mc:Choice xmlns:a14="http://schemas.microsoft.com/office/drawing/2010/main" Requires="a14">
+      <mc:AlternateContent xmlns:mc="http://schemas.openxmlformats.org/markup-compatibility/2006" xmlns:a14="http://schemas.microsoft.com/office/drawing/2010/main">
+        <mc:Choice Requires="a14">
           <p:sp>
             <p:nvSpPr>
               <p:cNvPr id="3" name="Content Placeholder 2"/>
@@ -5623,29 +5632,13 @@
                 </a14:m>
                 <a:r>
                   <a:rPr lang="en-GB" dirty="0" smtClean="0"/>
-                  <a:t>, it is possible to determine the </a:t>
-                </a:r>
-                <a:r>
-                  <a:rPr lang="en-GB" dirty="0" smtClean="0"/>
-                  <a:t>influence certain </a:t>
-                </a:r>
-                <a:r>
-                  <a:rPr lang="en-GB" dirty="0" smtClean="0"/>
-                  <a:t>design parameters (pad separation, corner radius)  and/or changing overall qubit design </a:t>
-                </a:r>
-                <a:r>
-                  <a:rPr lang="en-GB" dirty="0" smtClean="0"/>
-                  <a:t>(interdigitated, padded) </a:t>
-                </a:r>
-                <a:r>
-                  <a:rPr lang="en-GB" dirty="0" smtClean="0"/>
-                  <a:t>on participation ratio.</a:t>
+                  <a:t>, it is possible to determine the influence certain design parameters (pad separation, corner radius)  and/or changing overall qubit design (interdigitated, padded) on participation ratio.</a:t>
                 </a:r>
               </a:p>
             </p:txBody>
           </p:sp>
         </mc:Choice>
-        <mc:Fallback>
+        <mc:Fallback xmlns="">
           <p:sp>
             <p:nvSpPr>
               <p:cNvPr id="3" name="Content Placeholder 2"/>
@@ -8372,41 +8365,20 @@
           <a:p>
             <a:r>
               <a:rPr lang="en-US" dirty="0" smtClean="0"/>
-              <a:t>Metal-Vacuum interface (MV</a:t>
-            </a:r>
+              <a:t>Metal-Vacuum interface (MV)</a:t>
+            </a:r>
+          </a:p>
+          <a:p>
             <a:r>
               <a:rPr lang="en-US" dirty="0" smtClean="0"/>
-              <a:t>)</a:t>
+              <a:t>Metal-Substrate interface (MS)</a:t>
             </a:r>
           </a:p>
           <a:p>
             <a:r>
               <a:rPr lang="en-US" dirty="0" smtClean="0"/>
-              <a:t>Metal-Substrate </a:t>
-            </a:r>
-            <a:r>
-              <a:rPr lang="en-US" dirty="0" smtClean="0"/>
-              <a:t>interface (MS</a:t>
-            </a:r>
-            <a:r>
-              <a:rPr lang="en-US" dirty="0" smtClean="0"/>
-              <a:t>)</a:t>
-            </a:r>
-          </a:p>
-          <a:p>
-            <a:r>
-              <a:rPr lang="en-US" dirty="0" smtClean="0"/>
-              <a:t>Substrate-Vacuum </a:t>
-            </a:r>
-            <a:r>
-              <a:rPr lang="en-US" dirty="0" smtClean="0"/>
-              <a:t>(SV</a:t>
-            </a:r>
-            <a:r>
-              <a:rPr lang="en-US" dirty="0" smtClean="0"/>
-              <a:t>)</a:t>
-            </a:r>
-            <a:endParaRPr lang="en-US" dirty="0" smtClean="0"/>
+              <a:t>Substrate-Vacuum (SV)</a:t>
+            </a:r>
           </a:p>
           <a:p>
             <a:pPr marL="0" indent="0">
@@ -9695,11 +9667,11 @@
   <p:clrMapOvr>
     <a:masterClrMapping/>
   </p:clrMapOvr>
-  <mc:AlternateContent xmlns:mc="http://schemas.openxmlformats.org/markup-compatibility/2006">
-    <mc:Choice xmlns:p14="http://schemas.microsoft.com/office/powerpoint/2010/main" Requires="p14">
+  <mc:AlternateContent xmlns:mc="http://schemas.openxmlformats.org/markup-compatibility/2006" xmlns:p14="http://schemas.microsoft.com/office/powerpoint/2010/main">
+    <mc:Choice Requires="p14">
       <p:transition spd="slow" p14:dur="2000"/>
     </mc:Choice>
-    <mc:Fallback>
+    <mc:Fallback xmlns="">
       <p:transition spd="slow"/>
     </mc:Fallback>
   </mc:AlternateContent>
@@ -9866,8 +9838,8 @@
           </a:p>
         </p:txBody>
       </p:sp>
-      <mc:AlternateContent xmlns:mc="http://schemas.openxmlformats.org/markup-compatibility/2006">
-        <mc:Choice xmlns:a14="http://schemas.microsoft.com/office/drawing/2010/main" Requires="a14">
+      <mc:AlternateContent xmlns:mc="http://schemas.openxmlformats.org/markup-compatibility/2006" xmlns:a14="http://schemas.microsoft.com/office/drawing/2010/main">
+        <mc:Choice Requires="a14">
           <p:sp>
             <p:nvSpPr>
               <p:cNvPr id="3" name="Content Placeholder 2"/>
@@ -9977,13 +9949,8 @@
                 </a:pPr>
                 <a:r>
                   <a:rPr lang="en-GB" dirty="0" smtClean="0"/>
-                  <a:t>Metal-Substrate: </a:t>
+                  <a:t>Metal-Substrate: Si-nitride</a:t>
                 </a:r>
-                <a:r>
-                  <a:rPr lang="en-GB" dirty="0" smtClean="0"/>
-                  <a:t>Si-nitride</a:t>
-                </a:r>
-                <a:endParaRPr lang="en-GB" dirty="0" smtClean="0"/>
               </a:p>
               <a:p>
                 <a:pPr marL="0" indent="0">
@@ -10105,7 +10072,7 @@
             </p:txBody>
           </p:sp>
         </mc:Choice>
-        <mc:Fallback>
+        <mc:Fallback xmlns="">
           <p:sp>
             <p:nvSpPr>
               <p:cNvPr id="3" name="Content Placeholder 2"/>
@@ -10199,8 +10166,8 @@
           </a:p>
         </p:txBody>
       </p:sp>
-      <mc:AlternateContent xmlns:mc="http://schemas.openxmlformats.org/markup-compatibility/2006">
-        <mc:Choice xmlns:a14="http://schemas.microsoft.com/office/drawing/2010/main" Requires="a14">
+      <mc:AlternateContent xmlns:mc="http://schemas.openxmlformats.org/markup-compatibility/2006" xmlns:a14="http://schemas.microsoft.com/office/drawing/2010/main">
+        <mc:Choice Requires="a14">
           <p:sp>
             <p:nvSpPr>
               <p:cNvPr id="3" name="Content Placeholder 2"/>
@@ -10403,7 +10370,7 @@
             </p:txBody>
           </p:sp>
         </mc:Choice>
-        <mc:Fallback>
+        <mc:Fallback xmlns="">
           <p:sp>
             <p:nvSpPr>
               <p:cNvPr id="3" name="Content Placeholder 2"/>

</xml_diff>